<commit_message>
Daily Routine Project Done
</commit_message>
<xml_diff>
--- a/docpac_06071022/Weekly Review.pptx
+++ b/docpac_06071022/Weekly Review.pptx
@@ -6,10 +6,12 @@
   </p:sldMasterIdLst>
   <p:sldIdLst>
     <p:sldId id="256" r:id="rId5"/>
-    <p:sldId id="257" r:id="rId6"/>
-    <p:sldId id="279" r:id="rId7"/>
-    <p:sldId id="280" r:id="rId8"/>
-    <p:sldId id="259" r:id="rId9"/>
+    <p:sldId id="282" r:id="rId6"/>
+    <p:sldId id="257" r:id="rId7"/>
+    <p:sldId id="279" r:id="rId8"/>
+    <p:sldId id="280" r:id="rId9"/>
+    <p:sldId id="259" r:id="rId10"/>
+    <p:sldId id="281" r:id="rId11"/>
   </p:sldIdLst>
   <p:sldSz cx="12192000" cy="6858000"/>
   <p:notesSz cx="6858000" cy="9144000"/>
@@ -114,6 +116,14 @@
     </p:ext>
   </p:extLst>
 </p:presentation>
+</file>
+
+<file path=ppt/revisionInfo.xml><?xml version="1.0" encoding="utf-8"?>
+<p1510:revInfo xmlns:a="http://schemas.openxmlformats.org/drawingml/2006/main" xmlns:r="http://schemas.openxmlformats.org/officeDocument/2006/relationships" xmlns:p1510="http://schemas.microsoft.com/office/powerpoint/2015/10/main">
+  <p1510:revLst>
+    <p1510:client id="{A97F2583-F198-45FD-B73D-6B3CCC4BDB8F}" v="5" dt="2022-10-03T17:00:26.973"/>
+  </p1510:revLst>
+</p1510:revInfo>
 </file>
 
 <file path=ppt/changesInfos/changesInfo1.xml><?xml version="1.0" encoding="utf-8"?>
@@ -435,6 +445,53 @@
     </pc:docChg>
   </pc:docChgLst>
   <pc:docChgLst>
+    <pc:chgData name="SMITH, CHRISTOPHER" userId="dd7fc2d5-9988-40ef-9498-c94fd49fd9a4" providerId="ADAL" clId="{A97F2583-F198-45FD-B73D-6B3CCC4BDB8F}"/>
+    <pc:docChg chg="custSel addSld modSld">
+      <pc:chgData name="SMITH, CHRISTOPHER" userId="dd7fc2d5-9988-40ef-9498-c94fd49fd9a4" providerId="ADAL" clId="{A97F2583-F198-45FD-B73D-6B3CCC4BDB8F}" dt="2022-10-03T17:28:43.369" v="401" actId="20577"/>
+      <pc:docMkLst>
+        <pc:docMk/>
+      </pc:docMkLst>
+      <pc:sldChg chg="modSp new mod modAnim">
+        <pc:chgData name="SMITH, CHRISTOPHER" userId="dd7fc2d5-9988-40ef-9498-c94fd49fd9a4" providerId="ADAL" clId="{A97F2583-F198-45FD-B73D-6B3CCC4BDB8F}" dt="2022-10-03T17:00:26.973" v="363" actId="20577"/>
+        <pc:sldMkLst>
+          <pc:docMk/>
+          <pc:sldMk cId="3394236165" sldId="281"/>
+        </pc:sldMkLst>
+        <pc:spChg chg="mod">
+          <ac:chgData name="SMITH, CHRISTOPHER" userId="dd7fc2d5-9988-40ef-9498-c94fd49fd9a4" providerId="ADAL" clId="{A97F2583-F198-45FD-B73D-6B3CCC4BDB8F}" dt="2022-10-03T16:57:20.571" v="4" actId="20577"/>
+          <ac:spMkLst>
+            <pc:docMk/>
+            <pc:sldMk cId="3394236165" sldId="281"/>
+            <ac:spMk id="2" creationId="{A222096C-9885-54BF-11F5-53400D81B12A}"/>
+          </ac:spMkLst>
+        </pc:spChg>
+        <pc:spChg chg="mod">
+          <ac:chgData name="SMITH, CHRISTOPHER" userId="dd7fc2d5-9988-40ef-9498-c94fd49fd9a4" providerId="ADAL" clId="{A97F2583-F198-45FD-B73D-6B3CCC4BDB8F}" dt="2022-10-03T17:00:26.973" v="363" actId="20577"/>
+          <ac:spMkLst>
+            <pc:docMk/>
+            <pc:sldMk cId="3394236165" sldId="281"/>
+            <ac:spMk id="3" creationId="{E60E0BBB-CB54-BE70-34E1-E41A9CFA4AE7}"/>
+          </ac:spMkLst>
+        </pc:spChg>
+      </pc:sldChg>
+      <pc:sldChg chg="modSp new mod">
+        <pc:chgData name="SMITH, CHRISTOPHER" userId="dd7fc2d5-9988-40ef-9498-c94fd49fd9a4" providerId="ADAL" clId="{A97F2583-F198-45FD-B73D-6B3CCC4BDB8F}" dt="2022-10-03T17:28:43.369" v="401" actId="20577"/>
+        <pc:sldMkLst>
+          <pc:docMk/>
+          <pc:sldMk cId="2088946378" sldId="282"/>
+        </pc:sldMkLst>
+        <pc:spChg chg="mod">
+          <ac:chgData name="SMITH, CHRISTOPHER" userId="dd7fc2d5-9988-40ef-9498-c94fd49fd9a4" providerId="ADAL" clId="{A97F2583-F198-45FD-B73D-6B3CCC4BDB8F}" dt="2022-10-03T17:28:43.369" v="401" actId="20577"/>
+          <ac:spMkLst>
+            <pc:docMk/>
+            <pc:sldMk cId="2088946378" sldId="282"/>
+            <ac:spMk id="2" creationId="{839092BC-AD9A-32D9-D8EC-3ACCC7513D34}"/>
+          </ac:spMkLst>
+        </pc:spChg>
+      </pc:sldChg>
+    </pc:docChg>
+  </pc:docChgLst>
+  <pc:docChgLst>
     <pc:chgData name="SMITH, CHRISTOPHER" userId="dd7fc2d5-9988-40ef-9498-c94fd49fd9a4" providerId="ADAL" clId="{DBB1542E-3718-4BD7-AD49-BC45DFF5E8C6}"/>
     <pc:docChg chg="undo custSel addSld delSld modSld">
       <pc:chgData name="SMITH, CHRISTOPHER" userId="dd7fc2d5-9988-40ef-9498-c94fd49fd9a4" providerId="ADAL" clId="{DBB1542E-3718-4BD7-AD49-BC45DFF5E8C6}" dt="2022-09-26T12:22:33.761" v="2897" actId="20577"/>
@@ -3809,6 +3866,89 @@
           <p:cNvPr id="2" name="Title 1">
             <a:extLst>
               <a:ext uri="{FF2B5EF4-FFF2-40B4-BE49-F238E27FC236}">
+                <a16:creationId xmlns:a16="http://schemas.microsoft.com/office/drawing/2014/main" id="{839092BC-AD9A-32D9-D8EC-3ACCC7513D34}"/>
+              </a:ext>
+            </a:extLst>
+          </p:cNvPr>
+          <p:cNvSpPr>
+            <a:spLocks noGrp="1"/>
+          </p:cNvSpPr>
+          <p:nvPr>
+            <p:ph type="title"/>
+          </p:nvPr>
+        </p:nvSpPr>
+        <p:spPr/>
+        <p:txBody>
+          <a:bodyPr/>
+          <a:lstStyle/>
+          <a:p>
+            <a:r>
+              <a:rPr lang="en-US" dirty="0"/>
+              <a:t>A Note About The Desktop Mounts</a:t>
+            </a:r>
+          </a:p>
+        </p:txBody>
+      </p:sp>
+      <p:sp>
+        <p:nvSpPr>
+          <p:cNvPr id="3" name="Content Placeholder 2">
+            <a:extLst>
+              <a:ext uri="{FF2B5EF4-FFF2-40B4-BE49-F238E27FC236}">
+                <a16:creationId xmlns:a16="http://schemas.microsoft.com/office/drawing/2014/main" id="{C60C429B-6E71-257A-F9E3-BB5A55CE54C9}"/>
+              </a:ext>
+            </a:extLst>
+          </p:cNvPr>
+          <p:cNvSpPr>
+            <a:spLocks noGrp="1"/>
+          </p:cNvSpPr>
+          <p:nvPr>
+            <p:ph idx="1"/>
+          </p:nvPr>
+        </p:nvSpPr>
+        <p:spPr/>
+        <p:txBody>
+          <a:bodyPr/>
+          <a:lstStyle/>
+          <a:p>
+            <a:endParaRPr lang="en-US" dirty="0"/>
+          </a:p>
+        </p:txBody>
+      </p:sp>
+    </p:spTree>
+    <p:extLst>
+      <p:ext uri="{BB962C8B-B14F-4D97-AF65-F5344CB8AC3E}">
+        <p14:creationId xmlns:p14="http://schemas.microsoft.com/office/powerpoint/2010/main" val="2088946378"/>
+      </p:ext>
+    </p:extLst>
+  </p:cSld>
+  <p:clrMapOvr>
+    <a:masterClrMapping/>
+  </p:clrMapOvr>
+</p:sld>
+</file>
+
+<file path=ppt/slides/slide3.xml><?xml version="1.0" encoding="utf-8"?>
+<p:sld xmlns:a="http://schemas.openxmlformats.org/drawingml/2006/main" xmlns:r="http://schemas.openxmlformats.org/officeDocument/2006/relationships" xmlns:p="http://schemas.openxmlformats.org/presentationml/2006/main">
+  <p:cSld>
+    <p:spTree>
+      <p:nvGrpSpPr>
+        <p:cNvPr id="1" name=""/>
+        <p:cNvGrpSpPr/>
+        <p:nvPr/>
+      </p:nvGrpSpPr>
+      <p:grpSpPr>
+        <a:xfrm>
+          <a:off x="0" y="0"/>
+          <a:ext cx="0" cy="0"/>
+          <a:chOff x="0" y="0"/>
+          <a:chExt cx="0" cy="0"/>
+        </a:xfrm>
+      </p:grpSpPr>
+      <p:sp>
+        <p:nvSpPr>
+          <p:cNvPr id="2" name="Title 1">
+            <a:extLst>
+              <a:ext uri="{FF2B5EF4-FFF2-40B4-BE49-F238E27FC236}">
                 <a16:creationId xmlns:a16="http://schemas.microsoft.com/office/drawing/2014/main" id="{B0DFCF5C-50BB-4E76-B3FD-DD7D974ECE50}"/>
               </a:ext>
             </a:extLst>
@@ -3955,7 +4095,7 @@
 </p:sld>
 </file>
 
-<file path=ppt/slides/slide3.xml><?xml version="1.0" encoding="utf-8"?>
+<file path=ppt/slides/slide4.xml><?xml version="1.0" encoding="utf-8"?>
 <p:sld xmlns:a="http://schemas.openxmlformats.org/drawingml/2006/main" xmlns:r="http://schemas.openxmlformats.org/officeDocument/2006/relationships" xmlns:p="http://schemas.openxmlformats.org/presentationml/2006/main">
   <p:cSld>
     <p:spTree>
@@ -4402,7 +4542,7 @@
 </p:sld>
 </file>
 
-<file path=ppt/slides/slide4.xml><?xml version="1.0" encoding="utf-8"?>
+<file path=ppt/slides/slide5.xml><?xml version="1.0" encoding="utf-8"?>
 <p:sld xmlns:a="http://schemas.openxmlformats.org/drawingml/2006/main" xmlns:r="http://schemas.openxmlformats.org/officeDocument/2006/relationships" xmlns:p="http://schemas.openxmlformats.org/presentationml/2006/main">
   <p:cSld>
     <p:spTree>
@@ -4799,7 +4939,7 @@
 </p:sld>
 </file>
 
-<file path=ppt/slides/slide5.xml><?xml version="1.0" encoding="utf-8"?>
+<file path=ppt/slides/slide6.xml><?xml version="1.0" encoding="utf-8"?>
 <p:sld xmlns:a="http://schemas.openxmlformats.org/drawingml/2006/main" xmlns:r="http://schemas.openxmlformats.org/officeDocument/2006/relationships" xmlns:p="http://schemas.openxmlformats.org/presentationml/2006/main">
   <p:cSld>
     <p:spTree>
@@ -5263,6 +5403,478 @@
                                     <p:set>
                                       <p:cBhvr>
                                         <p:cTn id="28" dur="1" fill="hold">
+                                          <p:stCondLst>
+                                            <p:cond delay="0"/>
+                                          </p:stCondLst>
+                                        </p:cTn>
+                                        <p:tgtEl>
+                                          <p:spTgt spid="3">
+                                            <p:txEl>
+                                              <p:pRg st="7" end="7"/>
+                                            </p:txEl>
+                                          </p:spTgt>
+                                        </p:tgtEl>
+                                        <p:attrNameLst>
+                                          <p:attrName>style.visibility</p:attrName>
+                                        </p:attrNameLst>
+                                      </p:cBhvr>
+                                      <p:to>
+                                        <p:strVal val="visible"/>
+                                      </p:to>
+                                    </p:set>
+                                  </p:childTnLst>
+                                </p:cTn>
+                              </p:par>
+                            </p:childTnLst>
+                          </p:cTn>
+                        </p:par>
+                      </p:childTnLst>
+                    </p:cTn>
+                  </p:par>
+                </p:childTnLst>
+              </p:cTn>
+              <p:prevCondLst>
+                <p:cond evt="onPrev" delay="0">
+                  <p:tgtEl>
+                    <p:sldTgt/>
+                  </p:tgtEl>
+                </p:cond>
+              </p:prevCondLst>
+              <p:nextCondLst>
+                <p:cond evt="onNext" delay="0">
+                  <p:tgtEl>
+                    <p:sldTgt/>
+                  </p:tgtEl>
+                </p:cond>
+              </p:nextCondLst>
+            </p:seq>
+          </p:childTnLst>
+        </p:cTn>
+      </p:par>
+    </p:tnLst>
+    <p:bldLst>
+      <p:bldP spid="3" grpId="0" build="p"/>
+    </p:bldLst>
+  </p:timing>
+</p:sld>
+</file>
+
+<file path=ppt/slides/slide7.xml><?xml version="1.0" encoding="utf-8"?>
+<p:sld xmlns:a="http://schemas.openxmlformats.org/drawingml/2006/main" xmlns:r="http://schemas.openxmlformats.org/officeDocument/2006/relationships" xmlns:p="http://schemas.openxmlformats.org/presentationml/2006/main">
+  <p:cSld>
+    <p:spTree>
+      <p:nvGrpSpPr>
+        <p:cNvPr id="1" name=""/>
+        <p:cNvGrpSpPr/>
+        <p:nvPr/>
+      </p:nvGrpSpPr>
+      <p:grpSpPr>
+        <a:xfrm>
+          <a:off x="0" y="0"/>
+          <a:ext cx="0" cy="0"/>
+          <a:chOff x="0" y="0"/>
+          <a:chExt cx="0" cy="0"/>
+        </a:xfrm>
+      </p:grpSpPr>
+      <p:sp>
+        <p:nvSpPr>
+          <p:cNvPr id="2" name="Title 1">
+            <a:extLst>
+              <a:ext uri="{FF2B5EF4-FFF2-40B4-BE49-F238E27FC236}">
+                <a16:creationId xmlns:a16="http://schemas.microsoft.com/office/drawing/2014/main" id="{A222096C-9885-54BF-11F5-53400D81B12A}"/>
+              </a:ext>
+            </a:extLst>
+          </p:cNvPr>
+          <p:cNvSpPr>
+            <a:spLocks noGrp="1"/>
+          </p:cNvSpPr>
+          <p:nvPr>
+            <p:ph type="title"/>
+          </p:nvPr>
+        </p:nvSpPr>
+        <p:spPr/>
+        <p:txBody>
+          <a:bodyPr/>
+          <a:lstStyle/>
+          <a:p>
+            <a:r>
+              <a:rPr lang="en-US" dirty="0"/>
+              <a:t>Pogs</a:t>
+            </a:r>
+          </a:p>
+        </p:txBody>
+      </p:sp>
+      <p:sp>
+        <p:nvSpPr>
+          <p:cNvPr id="3" name="Content Placeholder 2">
+            <a:extLst>
+              <a:ext uri="{FF2B5EF4-FFF2-40B4-BE49-F238E27FC236}">
+                <a16:creationId xmlns:a16="http://schemas.microsoft.com/office/drawing/2014/main" id="{E60E0BBB-CB54-BE70-34E1-E41A9CFA4AE7}"/>
+              </a:ext>
+            </a:extLst>
+          </p:cNvPr>
+          <p:cNvSpPr>
+            <a:spLocks noGrp="1"/>
+          </p:cNvSpPr>
+          <p:nvPr>
+            <p:ph idx="1"/>
+          </p:nvPr>
+        </p:nvSpPr>
+        <p:spPr/>
+        <p:txBody>
+          <a:bodyPr/>
+          <a:lstStyle/>
+          <a:p>
+            <a:r>
+              <a:rPr lang="en-US" dirty="0"/>
+              <a:t>We need more things we can spend pogs on</a:t>
+            </a:r>
+          </a:p>
+          <a:p>
+            <a:r>
+              <a:rPr lang="en-US" dirty="0"/>
+              <a:t>I have a box of snacks under the server rack</a:t>
+            </a:r>
+          </a:p>
+          <a:p>
+            <a:pPr lvl="1"/>
+            <a:r>
+              <a:rPr lang="en-US" dirty="0"/>
+              <a:t>1 pog per snack</a:t>
+            </a:r>
+          </a:p>
+          <a:p>
+            <a:pPr lvl="1"/>
+            <a:r>
+              <a:rPr lang="en-US" dirty="0"/>
+              <a:t>1 pog per class to eat them</a:t>
+            </a:r>
+          </a:p>
+          <a:p>
+            <a:pPr lvl="1"/>
+            <a:r>
+              <a:rPr lang="en-US" dirty="0"/>
+              <a:t>For example: 3 pogs to eat two snacks</a:t>
+            </a:r>
+          </a:p>
+          <a:p>
+            <a:r>
+              <a:rPr lang="en-US" dirty="0"/>
+              <a:t>Negotiate for things:</a:t>
+            </a:r>
+          </a:p>
+          <a:p>
+            <a:pPr lvl="1"/>
+            <a:r>
+              <a:rPr lang="en-US" dirty="0"/>
+              <a:t>Yes, I will leave you alone to do non-classwork all day for enough pogs</a:t>
+            </a:r>
+          </a:p>
+          <a:p>
+            <a:pPr lvl="1"/>
+            <a:r>
+              <a:rPr lang="en-US" dirty="0"/>
+              <a:t>Unless you have an A, don’t even ask about </a:t>
+            </a:r>
+            <a:r>
+              <a:rPr lang="en-US"/>
+              <a:t>cell phones</a:t>
+            </a:r>
+          </a:p>
+        </p:txBody>
+      </p:sp>
+    </p:spTree>
+    <p:extLst>
+      <p:ext uri="{BB962C8B-B14F-4D97-AF65-F5344CB8AC3E}">
+        <p14:creationId xmlns:p14="http://schemas.microsoft.com/office/powerpoint/2010/main" val="3394236165"/>
+      </p:ext>
+    </p:extLst>
+  </p:cSld>
+  <p:clrMapOvr>
+    <a:masterClrMapping/>
+  </p:clrMapOvr>
+  <p:timing>
+    <p:tnLst>
+      <p:par>
+        <p:cTn id="1" dur="indefinite" restart="never" nodeType="tmRoot">
+          <p:childTnLst>
+            <p:seq concurrent="1" nextAc="seek">
+              <p:cTn id="2" dur="indefinite" nodeType="mainSeq">
+                <p:childTnLst>
+                  <p:par>
+                    <p:cTn id="3" fill="hold">
+                      <p:stCondLst>
+                        <p:cond delay="indefinite"/>
+                      </p:stCondLst>
+                      <p:childTnLst>
+                        <p:par>
+                          <p:cTn id="4" fill="hold">
+                            <p:stCondLst>
+                              <p:cond delay="0"/>
+                            </p:stCondLst>
+                            <p:childTnLst>
+                              <p:par>
+                                <p:cTn id="5" presetID="1" presetClass="entr" presetSubtype="0" fill="hold" grpId="0" nodeType="clickEffect">
+                                  <p:stCondLst>
+                                    <p:cond delay="0"/>
+                                  </p:stCondLst>
+                                  <p:childTnLst>
+                                    <p:set>
+                                      <p:cBhvr>
+                                        <p:cTn id="6" dur="1" fill="hold">
+                                          <p:stCondLst>
+                                            <p:cond delay="0"/>
+                                          </p:stCondLst>
+                                        </p:cTn>
+                                        <p:tgtEl>
+                                          <p:spTgt spid="3">
+                                            <p:txEl>
+                                              <p:pRg st="0" end="0"/>
+                                            </p:txEl>
+                                          </p:spTgt>
+                                        </p:tgtEl>
+                                        <p:attrNameLst>
+                                          <p:attrName>style.visibility</p:attrName>
+                                        </p:attrNameLst>
+                                      </p:cBhvr>
+                                      <p:to>
+                                        <p:strVal val="visible"/>
+                                      </p:to>
+                                    </p:set>
+                                  </p:childTnLst>
+                                </p:cTn>
+                              </p:par>
+                            </p:childTnLst>
+                          </p:cTn>
+                        </p:par>
+                      </p:childTnLst>
+                    </p:cTn>
+                  </p:par>
+                  <p:par>
+                    <p:cTn id="7" fill="hold">
+                      <p:stCondLst>
+                        <p:cond delay="indefinite"/>
+                      </p:stCondLst>
+                      <p:childTnLst>
+                        <p:par>
+                          <p:cTn id="8" fill="hold">
+                            <p:stCondLst>
+                              <p:cond delay="0"/>
+                            </p:stCondLst>
+                            <p:childTnLst>
+                              <p:par>
+                                <p:cTn id="9" presetID="1" presetClass="entr" presetSubtype="0" fill="hold" grpId="0" nodeType="clickEffect">
+                                  <p:stCondLst>
+                                    <p:cond delay="0"/>
+                                  </p:stCondLst>
+                                  <p:childTnLst>
+                                    <p:set>
+                                      <p:cBhvr>
+                                        <p:cTn id="10" dur="1" fill="hold">
+                                          <p:stCondLst>
+                                            <p:cond delay="0"/>
+                                          </p:stCondLst>
+                                        </p:cTn>
+                                        <p:tgtEl>
+                                          <p:spTgt spid="3">
+                                            <p:txEl>
+                                              <p:pRg st="1" end="1"/>
+                                            </p:txEl>
+                                          </p:spTgt>
+                                        </p:tgtEl>
+                                        <p:attrNameLst>
+                                          <p:attrName>style.visibility</p:attrName>
+                                        </p:attrNameLst>
+                                      </p:cBhvr>
+                                      <p:to>
+                                        <p:strVal val="visible"/>
+                                      </p:to>
+                                    </p:set>
+                                  </p:childTnLst>
+                                </p:cTn>
+                              </p:par>
+                              <p:par>
+                                <p:cTn id="11" presetID="1" presetClass="entr" presetSubtype="0" fill="hold" grpId="0" nodeType="withEffect">
+                                  <p:stCondLst>
+                                    <p:cond delay="0"/>
+                                  </p:stCondLst>
+                                  <p:childTnLst>
+                                    <p:set>
+                                      <p:cBhvr>
+                                        <p:cTn id="12" dur="1" fill="hold">
+                                          <p:stCondLst>
+                                            <p:cond delay="0"/>
+                                          </p:stCondLst>
+                                        </p:cTn>
+                                        <p:tgtEl>
+                                          <p:spTgt spid="3">
+                                            <p:txEl>
+                                              <p:pRg st="2" end="2"/>
+                                            </p:txEl>
+                                          </p:spTgt>
+                                        </p:tgtEl>
+                                        <p:attrNameLst>
+                                          <p:attrName>style.visibility</p:attrName>
+                                        </p:attrNameLst>
+                                      </p:cBhvr>
+                                      <p:to>
+                                        <p:strVal val="visible"/>
+                                      </p:to>
+                                    </p:set>
+                                  </p:childTnLst>
+                                </p:cTn>
+                              </p:par>
+                              <p:par>
+                                <p:cTn id="13" presetID="1" presetClass="entr" presetSubtype="0" fill="hold" grpId="0" nodeType="withEffect">
+                                  <p:stCondLst>
+                                    <p:cond delay="0"/>
+                                  </p:stCondLst>
+                                  <p:childTnLst>
+                                    <p:set>
+                                      <p:cBhvr>
+                                        <p:cTn id="14" dur="1" fill="hold">
+                                          <p:stCondLst>
+                                            <p:cond delay="0"/>
+                                          </p:stCondLst>
+                                        </p:cTn>
+                                        <p:tgtEl>
+                                          <p:spTgt spid="3">
+                                            <p:txEl>
+                                              <p:pRg st="3" end="3"/>
+                                            </p:txEl>
+                                          </p:spTgt>
+                                        </p:tgtEl>
+                                        <p:attrNameLst>
+                                          <p:attrName>style.visibility</p:attrName>
+                                        </p:attrNameLst>
+                                      </p:cBhvr>
+                                      <p:to>
+                                        <p:strVal val="visible"/>
+                                      </p:to>
+                                    </p:set>
+                                  </p:childTnLst>
+                                </p:cTn>
+                              </p:par>
+                              <p:par>
+                                <p:cTn id="15" presetID="1" presetClass="entr" presetSubtype="0" fill="hold" grpId="0" nodeType="withEffect">
+                                  <p:stCondLst>
+                                    <p:cond delay="0"/>
+                                  </p:stCondLst>
+                                  <p:childTnLst>
+                                    <p:set>
+                                      <p:cBhvr>
+                                        <p:cTn id="16" dur="1" fill="hold">
+                                          <p:stCondLst>
+                                            <p:cond delay="0"/>
+                                          </p:stCondLst>
+                                        </p:cTn>
+                                        <p:tgtEl>
+                                          <p:spTgt spid="3">
+                                            <p:txEl>
+                                              <p:pRg st="4" end="4"/>
+                                            </p:txEl>
+                                          </p:spTgt>
+                                        </p:tgtEl>
+                                        <p:attrNameLst>
+                                          <p:attrName>style.visibility</p:attrName>
+                                        </p:attrNameLst>
+                                      </p:cBhvr>
+                                      <p:to>
+                                        <p:strVal val="visible"/>
+                                      </p:to>
+                                    </p:set>
+                                  </p:childTnLst>
+                                </p:cTn>
+                              </p:par>
+                            </p:childTnLst>
+                          </p:cTn>
+                        </p:par>
+                      </p:childTnLst>
+                    </p:cTn>
+                  </p:par>
+                  <p:par>
+                    <p:cTn id="17" fill="hold">
+                      <p:stCondLst>
+                        <p:cond delay="indefinite"/>
+                      </p:stCondLst>
+                      <p:childTnLst>
+                        <p:par>
+                          <p:cTn id="18" fill="hold">
+                            <p:stCondLst>
+                              <p:cond delay="0"/>
+                            </p:stCondLst>
+                            <p:childTnLst>
+                              <p:par>
+                                <p:cTn id="19" presetID="1" presetClass="entr" presetSubtype="0" fill="hold" grpId="0" nodeType="clickEffect">
+                                  <p:stCondLst>
+                                    <p:cond delay="0"/>
+                                  </p:stCondLst>
+                                  <p:childTnLst>
+                                    <p:set>
+                                      <p:cBhvr>
+                                        <p:cTn id="20" dur="1" fill="hold">
+                                          <p:stCondLst>
+                                            <p:cond delay="0"/>
+                                          </p:stCondLst>
+                                        </p:cTn>
+                                        <p:tgtEl>
+                                          <p:spTgt spid="3">
+                                            <p:txEl>
+                                              <p:pRg st="5" end="5"/>
+                                            </p:txEl>
+                                          </p:spTgt>
+                                        </p:tgtEl>
+                                        <p:attrNameLst>
+                                          <p:attrName>style.visibility</p:attrName>
+                                        </p:attrNameLst>
+                                      </p:cBhvr>
+                                      <p:to>
+                                        <p:strVal val="visible"/>
+                                      </p:to>
+                                    </p:set>
+                                  </p:childTnLst>
+                                </p:cTn>
+                              </p:par>
+                              <p:par>
+                                <p:cTn id="21" presetID="1" presetClass="entr" presetSubtype="0" fill="hold" grpId="0" nodeType="withEffect">
+                                  <p:stCondLst>
+                                    <p:cond delay="0"/>
+                                  </p:stCondLst>
+                                  <p:childTnLst>
+                                    <p:set>
+                                      <p:cBhvr>
+                                        <p:cTn id="22" dur="1" fill="hold">
+                                          <p:stCondLst>
+                                            <p:cond delay="0"/>
+                                          </p:stCondLst>
+                                        </p:cTn>
+                                        <p:tgtEl>
+                                          <p:spTgt spid="3">
+                                            <p:txEl>
+                                              <p:pRg st="6" end="6"/>
+                                            </p:txEl>
+                                          </p:spTgt>
+                                        </p:tgtEl>
+                                        <p:attrNameLst>
+                                          <p:attrName>style.visibility</p:attrName>
+                                        </p:attrNameLst>
+                                      </p:cBhvr>
+                                      <p:to>
+                                        <p:strVal val="visible"/>
+                                      </p:to>
+                                    </p:set>
+                                  </p:childTnLst>
+                                </p:cTn>
+                              </p:par>
+                              <p:par>
+                                <p:cTn id="23" presetID="1" presetClass="entr" presetSubtype="0" fill="hold" grpId="0" nodeType="withEffect">
+                                  <p:stCondLst>
+                                    <p:cond delay="0"/>
+                                  </p:stCondLst>
+                                  <p:childTnLst>
+                                    <p:set>
+                                      <p:cBhvr>
+                                        <p:cTn id="24" dur="1" fill="hold">
                                           <p:stCondLst>
                                             <p:cond delay="0"/>
                                           </p:stCondLst>

</xml_diff>